<commit_message>
Microcotroladores ajustess 23/09/2024 2024.2
</commit_message>
<xml_diff>
--- a/01 Classes/Aula 06 - Programação Microcontroladores - Periféricos Integrados - Temporizadores e PWM.pptx
+++ b/01 Classes/Aula 06 - Programação Microcontroladores - Periféricos Integrados - Temporizadores e PWM.pptx
@@ -6802,7 +6802,67 @@
                 <a:latin typeface="Times New Roman" panose="02020603050405020304" pitchFamily="18" charset="0"/>
                 <a:cs typeface="Times New Roman" panose="02020603050405020304" pitchFamily="18" charset="0"/>
               </a:rPr>
-              <a:t>São ideais para quem precisa programar equipamentos eletrônicos para ligar ou desligar, tais como: </a:t>
+              <a:t>São ideais para quem precisa </a:t>
+            </a:r>
+            <a:r>
+              <a:rPr lang="pt-BR" sz="2000" b="1" dirty="0">
+                <a:solidFill>
+                  <a:srgbClr val="FF0000"/>
+                </a:solidFill>
+                <a:latin typeface="Times New Roman" panose="02020603050405020304" pitchFamily="18" charset="0"/>
+                <a:cs typeface="Times New Roman" panose="02020603050405020304" pitchFamily="18" charset="0"/>
+              </a:rPr>
+              <a:t>programar equipamentos eletrônicos </a:t>
+            </a:r>
+            <a:r>
+              <a:rPr lang="pt-BR" sz="2000" dirty="0">
+                <a:solidFill>
+                  <a:schemeClr val="tx1"/>
+                </a:solidFill>
+                <a:latin typeface="Times New Roman" panose="02020603050405020304" pitchFamily="18" charset="0"/>
+                <a:cs typeface="Times New Roman" panose="02020603050405020304" pitchFamily="18" charset="0"/>
+              </a:rPr>
+              <a:t>para </a:t>
+            </a:r>
+            <a:r>
+              <a:rPr lang="pt-BR" sz="2000" b="1" dirty="0">
+                <a:solidFill>
+                  <a:schemeClr val="tx1"/>
+                </a:solidFill>
+                <a:latin typeface="Times New Roman" panose="02020603050405020304" pitchFamily="18" charset="0"/>
+                <a:cs typeface="Times New Roman" panose="02020603050405020304" pitchFamily="18" charset="0"/>
+              </a:rPr>
+              <a:t>ligar</a:t>
+            </a:r>
+            <a:r>
+              <a:rPr lang="pt-BR" sz="2000" dirty="0">
+                <a:solidFill>
+                  <a:schemeClr val="tx1"/>
+                </a:solidFill>
+                <a:latin typeface="Times New Roman" panose="02020603050405020304" pitchFamily="18" charset="0"/>
+                <a:cs typeface="Times New Roman" panose="02020603050405020304" pitchFamily="18" charset="0"/>
+              </a:rPr>
+              <a:t> ou </a:t>
+            </a:r>
+            <a:r>
+              <a:rPr lang="pt-BR" sz="2000" b="1" dirty="0">
+                <a:solidFill>
+                  <a:schemeClr val="tx1"/>
+                </a:solidFill>
+                <a:latin typeface="Times New Roman" panose="02020603050405020304" pitchFamily="18" charset="0"/>
+                <a:cs typeface="Times New Roman" panose="02020603050405020304" pitchFamily="18" charset="0"/>
+              </a:rPr>
+              <a:t>desligar</a:t>
+            </a:r>
+            <a:r>
+              <a:rPr lang="pt-BR" sz="2000" dirty="0">
+                <a:solidFill>
+                  <a:schemeClr val="tx1"/>
+                </a:solidFill>
+                <a:latin typeface="Times New Roman" panose="02020603050405020304" pitchFamily="18" charset="0"/>
+                <a:cs typeface="Times New Roman" panose="02020603050405020304" pitchFamily="18" charset="0"/>
+              </a:rPr>
+              <a:t>, tais como: </a:t>
             </a:r>
           </a:p>
           <a:p>
@@ -13998,7 +14058,7 @@
         </p:blipFill>
         <p:spPr>
           <a:xfrm>
-            <a:off x="613029" y="1063231"/>
+            <a:off x="447929" y="1063231"/>
             <a:ext cx="5549370" cy="3970470"/>
           </a:xfrm>
           <a:prstGeom prst="rect">
@@ -14006,6 +14066,125 @@
           </a:prstGeom>
         </p:spPr>
       </p:pic>
+      <p:sp>
+        <p:nvSpPr>
+          <p:cNvPr id="3" name="CaixaDeTexto 2">
+            <a:extLst>
+              <a:ext uri="{FF2B5EF4-FFF2-40B4-BE49-F238E27FC236}">
+                <a16:creationId xmlns:a16="http://schemas.microsoft.com/office/drawing/2014/main" id="{52A91276-BE62-5BFF-9A38-1667EF2F2B89}"/>
+              </a:ext>
+            </a:extLst>
+          </p:cNvPr>
+          <p:cNvSpPr txBox="1"/>
+          <p:nvPr/>
+        </p:nvSpPr>
+        <p:spPr>
+          <a:xfrm>
+            <a:off x="5978227" y="2805129"/>
+            <a:ext cx="3038773" cy="369332"/>
+          </a:xfrm>
+          <a:prstGeom prst="rect">
+            <a:avLst/>
+          </a:prstGeom>
+          <a:noFill/>
+          <a:ln w="12700" cap="flat">
+            <a:noFill/>
+            <a:miter lim="400000"/>
+          </a:ln>
+          <a:effectLst/>
+        </p:spPr>
+        <p:style>
+          <a:lnRef idx="0">
+            <a:scrgbClr r="0" g="0" b="0"/>
+          </a:lnRef>
+          <a:fillRef idx="0">
+            <a:scrgbClr r="0" g="0" b="0"/>
+          </a:fillRef>
+          <a:effectRef idx="0">
+            <a:scrgbClr r="0" g="0" b="0"/>
+          </a:effectRef>
+          <a:fontRef idx="none"/>
+        </p:style>
+        <p:txBody>
+          <a:bodyPr wrap="square">
+            <a:spAutoFit/>
+          </a:bodyPr>
+          <a:lstStyle/>
+          <a:p>
+            <a:r>
+              <a:rPr lang="pt-BR" dirty="0">
+                <a:hlinkClick r:id="rId4"/>
+              </a:rPr>
+              <a:t>https://youtu.be/nsDfsj-385w</a:t>
+            </a:r>
+            <a:r>
+              <a:rPr lang="pt-BR" dirty="0"/>
+              <a:t> </a:t>
+            </a:r>
+          </a:p>
+        </p:txBody>
+      </p:sp>
+      <p:sp>
+        <p:nvSpPr>
+          <p:cNvPr id="5" name="CaixaDeTexto 4">
+            <a:extLst>
+              <a:ext uri="{FF2B5EF4-FFF2-40B4-BE49-F238E27FC236}">
+                <a16:creationId xmlns:a16="http://schemas.microsoft.com/office/drawing/2014/main" id="{08CEBAEB-9E9D-88E2-85B7-E3E689EFBD77}"/>
+              </a:ext>
+            </a:extLst>
+          </p:cNvPr>
+          <p:cNvSpPr txBox="1"/>
+          <p:nvPr/>
+        </p:nvSpPr>
+        <p:spPr>
+          <a:xfrm>
+            <a:off x="5978227" y="3687108"/>
+            <a:ext cx="1251238" cy="369332"/>
+          </a:xfrm>
+          <a:prstGeom prst="rect">
+            <a:avLst/>
+          </a:prstGeom>
+          <a:noFill/>
+          <a:ln w="12700" cap="flat">
+            <a:noFill/>
+            <a:miter lim="400000"/>
+          </a:ln>
+          <a:effectLst/>
+        </p:spPr>
+        <p:style>
+          <a:lnRef idx="0">
+            <a:scrgbClr r="0" g="0" b="0"/>
+          </a:lnRef>
+          <a:fillRef idx="0">
+            <a:scrgbClr r="0" g="0" b="0"/>
+          </a:fillRef>
+          <a:effectRef idx="0">
+            <a:scrgbClr r="0" g="0" b="0"/>
+          </a:effectRef>
+          <a:fontRef idx="none"/>
+        </p:style>
+        <p:txBody>
+          <a:bodyPr wrap="square">
+            <a:spAutoFit/>
+          </a:bodyPr>
+          <a:lstStyle/>
+          <a:p>
+            <a:r>
+              <a:rPr lang="pt-BR" b="1" dirty="0" err="1">
+                <a:solidFill>
+                  <a:srgbClr val="FF0000"/>
+                </a:solidFill>
+              </a:rPr>
+              <a:t>bootloader</a:t>
+            </a:r>
+            <a:endParaRPr lang="pt-BR" b="1" dirty="0">
+              <a:solidFill>
+                <a:srgbClr val="FF0000"/>
+              </a:solidFill>
+            </a:endParaRPr>
+          </a:p>
+        </p:txBody>
+      </p:sp>
     </p:spTree>
     <p:extLst>
       <p:ext uri="{BB962C8B-B14F-4D97-AF65-F5344CB8AC3E}">
@@ -15812,7 +15991,24 @@
                 <a:latin typeface="Times New Roman" panose="02020603050405020304" pitchFamily="18" charset="0"/>
                 <a:cs typeface="Times New Roman" panose="02020603050405020304" pitchFamily="18" charset="0"/>
               </a:rPr>
-              <a:t> Módulo LED RGB com o PWM do Arduino</a:t>
+              <a:t> Módulo LED RGB com o PWM do Arduino (</a:t>
+            </a:r>
+            <a:r>
+              <a:rPr lang="pt-BR" sz="2000" b="1" dirty="0">
+                <a:solidFill>
+                  <a:srgbClr val="FF0000"/>
+                </a:solidFill>
+                <a:latin typeface="Times New Roman" panose="02020603050405020304" pitchFamily="18" charset="0"/>
+                <a:cs typeface="Times New Roman" panose="02020603050405020304" pitchFamily="18" charset="0"/>
+              </a:rPr>
+              <a:t>pinos PWM 9; 10; 11</a:t>
+            </a:r>
+            <a:r>
+              <a:rPr lang="pt-BR" sz="2000" b="1" dirty="0">
+                <a:latin typeface="Times New Roman" panose="02020603050405020304" pitchFamily="18" charset="0"/>
+                <a:cs typeface="Times New Roman" panose="02020603050405020304" pitchFamily="18" charset="0"/>
+              </a:rPr>
+              <a:t>)</a:t>
             </a:r>
           </a:p>
           <a:p>
@@ -15937,7 +16133,44 @@
                 <a:latin typeface="Times New Roman" panose="02020603050405020304" pitchFamily="18" charset="0"/>
                 <a:cs typeface="Times New Roman" panose="02020603050405020304" pitchFamily="18" charset="0"/>
               </a:rPr>
-              <a:t> </a:t>
+              <a:t> (</a:t>
+            </a:r>
+            <a:r>
+              <a:rPr lang="pt-BR" sz="2000" b="1" dirty="0">
+                <a:solidFill>
+                  <a:srgbClr val="FF0000"/>
+                </a:solidFill>
+                <a:latin typeface="Times New Roman" panose="02020603050405020304" pitchFamily="18" charset="0"/>
+                <a:cs typeface="Times New Roman" panose="02020603050405020304" pitchFamily="18" charset="0"/>
+              </a:rPr>
+              <a:t>fazer </a:t>
+            </a:r>
+            <a:r>
+              <a:rPr lang="pt-BR" sz="2000" b="1" dirty="0" err="1">
+                <a:solidFill>
+                  <a:srgbClr val="FF0000"/>
+                </a:solidFill>
+                <a:latin typeface="Times New Roman" panose="02020603050405020304" pitchFamily="18" charset="0"/>
+                <a:cs typeface="Times New Roman" panose="02020603050405020304" pitchFamily="18" charset="0"/>
+              </a:rPr>
+              <a:t>tb</a:t>
+            </a:r>
+            <a:r>
+              <a:rPr lang="pt-BR" sz="2000" b="1" dirty="0">
+                <a:solidFill>
+                  <a:srgbClr val="FF0000"/>
+                </a:solidFill>
+                <a:latin typeface="Times New Roman" panose="02020603050405020304" pitchFamily="18" charset="0"/>
+                <a:cs typeface="Times New Roman" panose="02020603050405020304" pitchFamily="18" charset="0"/>
+              </a:rPr>
+              <a:t> a atividade do motor DC</a:t>
+            </a:r>
+            <a:r>
+              <a:rPr lang="pt-BR" sz="2000" b="1" dirty="0">
+                <a:latin typeface="Times New Roman" panose="02020603050405020304" pitchFamily="18" charset="0"/>
+                <a:cs typeface="Times New Roman" panose="02020603050405020304" pitchFamily="18" charset="0"/>
+              </a:rPr>
+              <a:t>)</a:t>
             </a:r>
           </a:p>
         </p:txBody>
@@ -16047,7 +16280,188 @@
                 <a:latin typeface="Times New Roman" panose="02020603050405020304" pitchFamily="18" charset="0"/>
                 <a:cs typeface="Times New Roman" panose="02020603050405020304" pitchFamily="18" charset="0"/>
               </a:rPr>
-              <a:t>Um temporizador é um pequeno dispositivo que abre e fecha um circuito elétrico automaticamente e por um período de tempo específico. </a:t>
+              <a:t>Um </a:t>
+            </a:r>
+            <a:r>
+              <a:rPr lang="pt-BR" sz="2000" b="1" dirty="0">
+                <a:solidFill>
+                  <a:schemeClr val="tx1"/>
+                </a:solidFill>
+                <a:latin typeface="Times New Roman" panose="02020603050405020304" pitchFamily="18" charset="0"/>
+                <a:cs typeface="Times New Roman" panose="02020603050405020304" pitchFamily="18" charset="0"/>
+              </a:rPr>
+              <a:t>temporizador</a:t>
+            </a:r>
+            <a:r>
+              <a:rPr lang="pt-BR" sz="2000" dirty="0">
+                <a:solidFill>
+                  <a:schemeClr val="tx1"/>
+                </a:solidFill>
+                <a:latin typeface="Times New Roman" panose="02020603050405020304" pitchFamily="18" charset="0"/>
+                <a:cs typeface="Times New Roman" panose="02020603050405020304" pitchFamily="18" charset="0"/>
+              </a:rPr>
+              <a:t> é um pequeno dispositivo que abre e fecha um circuito elétrico automaticamente e por um período de tempo específico. </a:t>
+            </a:r>
+            <a:r>
+              <a:rPr lang="pt-BR" sz="2000" b="1" dirty="0">
+                <a:solidFill>
+                  <a:schemeClr val="tx1"/>
+                </a:solidFill>
+                <a:latin typeface="Times New Roman" panose="02020603050405020304" pitchFamily="18" charset="0"/>
+                <a:cs typeface="Times New Roman" panose="02020603050405020304" pitchFamily="18" charset="0"/>
+              </a:rPr>
+              <a:t>Tipos</a:t>
+            </a:r>
+            <a:r>
+              <a:rPr lang="pt-BR" sz="2000" dirty="0">
+                <a:solidFill>
+                  <a:schemeClr val="tx1"/>
+                </a:solidFill>
+                <a:latin typeface="Times New Roman" panose="02020603050405020304" pitchFamily="18" charset="0"/>
+                <a:cs typeface="Times New Roman" panose="02020603050405020304" pitchFamily="18" charset="0"/>
+              </a:rPr>
+              <a:t>: </a:t>
+            </a:r>
+            <a:r>
+              <a:rPr lang="pt-BR" sz="2000" b="1" dirty="0" err="1">
+                <a:solidFill>
+                  <a:srgbClr val="FF0000"/>
+                </a:solidFill>
+                <a:latin typeface="Times New Roman" panose="02020603050405020304" pitchFamily="18" charset="0"/>
+                <a:cs typeface="Times New Roman" panose="02020603050405020304" pitchFamily="18" charset="0"/>
+              </a:rPr>
+              <a:t>On</a:t>
+            </a:r>
+            <a:r>
+              <a:rPr lang="pt-BR" sz="2000" b="1" dirty="0">
+                <a:solidFill>
+                  <a:srgbClr val="FF0000"/>
+                </a:solidFill>
+                <a:latin typeface="Times New Roman" panose="02020603050405020304" pitchFamily="18" charset="0"/>
+                <a:cs typeface="Times New Roman" panose="02020603050405020304" pitchFamily="18" charset="0"/>
+              </a:rPr>
+              <a:t> delay(semáforo); Off delay (torneira </a:t>
+            </a:r>
+            <a:r>
+              <a:rPr lang="pt-BR" sz="2000" b="1" dirty="0" err="1">
+                <a:solidFill>
+                  <a:srgbClr val="FF0000"/>
+                </a:solidFill>
+                <a:latin typeface="Times New Roman" panose="02020603050405020304" pitchFamily="18" charset="0"/>
+                <a:cs typeface="Times New Roman" panose="02020603050405020304" pitchFamily="18" charset="0"/>
+              </a:rPr>
+              <a:t>shp</a:t>
+            </a:r>
+            <a:r>
+              <a:rPr lang="pt-BR" sz="2000" b="1" dirty="0">
+                <a:solidFill>
+                  <a:srgbClr val="FF0000"/>
+                </a:solidFill>
+                <a:latin typeface="Times New Roman" panose="02020603050405020304" pitchFamily="18" charset="0"/>
+                <a:cs typeface="Times New Roman" panose="02020603050405020304" pitchFamily="18" charset="0"/>
+              </a:rPr>
+              <a:t>); cíclico (</a:t>
+            </a:r>
+            <a:r>
+              <a:rPr lang="pt-BR" sz="2000" b="1" dirty="0" err="1">
+                <a:solidFill>
+                  <a:srgbClr val="FF0000"/>
+                </a:solidFill>
+                <a:latin typeface="Times New Roman" panose="02020603050405020304" pitchFamily="18" charset="0"/>
+                <a:cs typeface="Times New Roman" panose="02020603050405020304" pitchFamily="18" charset="0"/>
+              </a:rPr>
+              <a:t>maq</a:t>
+            </a:r>
+            <a:r>
+              <a:rPr lang="pt-BR" sz="2000" b="1" dirty="0">
+                <a:solidFill>
+                  <a:srgbClr val="FF0000"/>
+                </a:solidFill>
+                <a:latin typeface="Times New Roman" panose="02020603050405020304" pitchFamily="18" charset="0"/>
+                <a:cs typeface="Times New Roman" panose="02020603050405020304" pitchFamily="18" charset="0"/>
+              </a:rPr>
+              <a:t> lavar); estrela triângulo (compressores)</a:t>
+            </a:r>
+            <a:r>
+              <a:rPr lang="pt-BR" sz="2000" dirty="0">
+                <a:solidFill>
+                  <a:schemeClr val="tx1"/>
+                </a:solidFill>
+                <a:latin typeface="Times New Roman" panose="02020603050405020304" pitchFamily="18" charset="0"/>
+                <a:cs typeface="Times New Roman" panose="02020603050405020304" pitchFamily="18" charset="0"/>
+              </a:rPr>
+              <a:t>.</a:t>
+            </a:r>
+          </a:p>
+          <a:p>
+            <a:pPr marL="0" indent="0" algn="just">
+              <a:buNone/>
+            </a:pPr>
+            <a:r>
+              <a:rPr lang="pt-BR" sz="2000" dirty="0">
+                <a:solidFill>
+                  <a:schemeClr val="tx1"/>
+                </a:solidFill>
+                <a:latin typeface="Times New Roman" panose="02020603050405020304" pitchFamily="18" charset="0"/>
+                <a:cs typeface="Times New Roman" panose="02020603050405020304" pitchFamily="18" charset="0"/>
+              </a:rPr>
+              <a:t>		</a:t>
+            </a:r>
+            <a:r>
+              <a:rPr lang="pt-BR" sz="2000" b="1" dirty="0">
+                <a:solidFill>
+                  <a:schemeClr val="tx1"/>
+                </a:solidFill>
+                <a:latin typeface="Times New Roman" panose="02020603050405020304" pitchFamily="18" charset="0"/>
+                <a:cs typeface="Times New Roman" panose="02020603050405020304" pitchFamily="18" charset="0"/>
+              </a:rPr>
+              <a:t>Tipos de temporizador</a:t>
+            </a:r>
+            <a:r>
+              <a:rPr lang="pt-BR" sz="2000" dirty="0">
+                <a:solidFill>
+                  <a:schemeClr val="tx1"/>
+                </a:solidFill>
+                <a:latin typeface="Times New Roman" panose="02020603050405020304" pitchFamily="18" charset="0"/>
+                <a:cs typeface="Times New Roman" panose="02020603050405020304" pitchFamily="18" charset="0"/>
+              </a:rPr>
+              <a:t>: </a:t>
+            </a:r>
+            <a:r>
+              <a:rPr lang="pt-BR" sz="2000" dirty="0">
+                <a:solidFill>
+                  <a:schemeClr val="tx1"/>
+                </a:solidFill>
+                <a:latin typeface="Times New Roman" panose="02020603050405020304" pitchFamily="18" charset="0"/>
+                <a:cs typeface="Times New Roman" panose="02020603050405020304" pitchFamily="18" charset="0"/>
+                <a:hlinkClick r:id="rId3"/>
+              </a:rPr>
+              <a:t>https://youtu.be/rixV-vz6RDY</a:t>
+            </a:r>
+            <a:r>
+              <a:rPr lang="pt-BR" sz="2000" dirty="0">
+                <a:solidFill>
+                  <a:schemeClr val="tx1"/>
+                </a:solidFill>
+                <a:latin typeface="Times New Roman" panose="02020603050405020304" pitchFamily="18" charset="0"/>
+                <a:cs typeface="Times New Roman" panose="02020603050405020304" pitchFamily="18" charset="0"/>
+              </a:rPr>
+              <a:t> </a:t>
+            </a:r>
+          </a:p>
+          <a:p>
+            <a:pPr marL="0" indent="0" algn="just">
+              <a:buNone/>
+            </a:pPr>
+            <a:r>
+              <a:rPr lang="pt-BR" sz="2000" dirty="0">
+                <a:solidFill>
+                  <a:schemeClr val="tx1"/>
+                </a:solidFill>
+                <a:latin typeface="Times New Roman" panose="02020603050405020304" pitchFamily="18" charset="0"/>
+                <a:cs typeface="Times New Roman" panose="02020603050405020304" pitchFamily="18" charset="0"/>
+              </a:rPr>
+              <a:t>Em suma, podemos dizer que nos permite programar a ligação e desligamento de diferentes dispositivos de uma forma simples.</a:t>
             </a:r>
           </a:p>
           <a:p>
@@ -16074,34 +16488,62 @@
                 <a:latin typeface="Times New Roman" panose="02020603050405020304" pitchFamily="18" charset="0"/>
                 <a:cs typeface="Times New Roman" panose="02020603050405020304" pitchFamily="18" charset="0"/>
               </a:rPr>
-              <a:t>Em suma, podemos dizer que nos permite programar a ligação e desligamento de diferentes dispositivos de uma forma simples.</a:t>
+              <a:t>Diferente do </a:t>
+            </a:r>
+            <a:r>
+              <a:rPr lang="pt-BR" sz="2000" b="1" dirty="0">
+                <a:solidFill>
+                  <a:srgbClr val="FF0000"/>
+                </a:solidFill>
+                <a:latin typeface="Times New Roman" panose="02020603050405020304" pitchFamily="18" charset="0"/>
+                <a:cs typeface="Times New Roman" panose="02020603050405020304" pitchFamily="18" charset="0"/>
+              </a:rPr>
+              <a:t>timer</a:t>
+            </a:r>
+            <a:r>
+              <a:rPr lang="pt-BR" sz="2000" dirty="0">
+                <a:solidFill>
+                  <a:schemeClr val="tx1"/>
+                </a:solidFill>
+                <a:latin typeface="Times New Roman" panose="02020603050405020304" pitchFamily="18" charset="0"/>
+                <a:cs typeface="Times New Roman" panose="02020603050405020304" pitchFamily="18" charset="0"/>
+              </a:rPr>
+              <a:t> o </a:t>
+            </a:r>
+            <a:r>
+              <a:rPr lang="pt-BR" sz="2000" b="1" dirty="0">
+                <a:solidFill>
+                  <a:schemeClr val="tx1"/>
+                </a:solidFill>
+                <a:latin typeface="Times New Roman" panose="02020603050405020304" pitchFamily="18" charset="0"/>
+                <a:cs typeface="Times New Roman" panose="02020603050405020304" pitchFamily="18" charset="0"/>
+              </a:rPr>
+              <a:t>temporizador</a:t>
+            </a:r>
+            <a:r>
+              <a:rPr lang="pt-BR" sz="2000" dirty="0">
+                <a:solidFill>
+                  <a:schemeClr val="tx1"/>
+                </a:solidFill>
+                <a:latin typeface="Times New Roman" panose="02020603050405020304" pitchFamily="18" charset="0"/>
+                <a:cs typeface="Times New Roman" panose="02020603050405020304" pitchFamily="18" charset="0"/>
+              </a:rPr>
+              <a:t> não tem relógio então ele não tem horário para ligar desligar. o timer você mantém ele alimentado direto.</a:t>
             </a:r>
           </a:p>
           <a:p>
             <a:pPr marL="0" indent="0" algn="just">
               <a:buNone/>
             </a:pPr>
-            <a:endParaRPr lang="pt-BR" sz="2000" dirty="0">
-              <a:solidFill>
-                <a:schemeClr val="tx1"/>
-              </a:solidFill>
-              <a:latin typeface="Times New Roman" panose="02020603050405020304" pitchFamily="18" charset="0"/>
-              <a:cs typeface="Times New Roman" panose="02020603050405020304" pitchFamily="18" charset="0"/>
-            </a:endParaRPr>
-          </a:p>
-          <a:p>
-            <a:pPr marL="0" indent="0" algn="just">
-              <a:buNone/>
-            </a:pPr>
-            <a:r>
-              <a:rPr lang="pt-BR" sz="2000" dirty="0">
-                <a:solidFill>
-                  <a:schemeClr val="tx1"/>
-                </a:solidFill>
-                <a:latin typeface="Times New Roman" panose="02020603050405020304" pitchFamily="18" charset="0"/>
-                <a:cs typeface="Times New Roman" panose="02020603050405020304" pitchFamily="18" charset="0"/>
-              </a:rPr>
-              <a:t>Diferente do </a:t>
+            <a:r>
+              <a:rPr lang="pt-BR" sz="2000" dirty="0">
+                <a:solidFill>
+                  <a:schemeClr val="tx1"/>
+                </a:solidFill>
+                <a:latin typeface="Times New Roman" panose="02020603050405020304" pitchFamily="18" charset="0"/>
+                <a:cs typeface="Times New Roman" panose="02020603050405020304" pitchFamily="18" charset="0"/>
+              </a:rPr>
+              <a:t>		</a:t>
             </a:r>
             <a:r>
               <a:rPr lang="pt-BR" sz="2000" b="1" dirty="0">
@@ -16121,73 +16563,6 @@
                 <a:latin typeface="Times New Roman" panose="02020603050405020304" pitchFamily="18" charset="0"/>
                 <a:cs typeface="Times New Roman" panose="02020603050405020304" pitchFamily="18" charset="0"/>
               </a:rPr>
-              <a:t> o </a:t>
-            </a:r>
-            <a:r>
-              <a:rPr lang="pt-BR" sz="2000" b="1" dirty="0">
-                <a:solidFill>
-                  <a:schemeClr val="tx1"/>
-                </a:solidFill>
-                <a:latin typeface="Times New Roman" panose="02020603050405020304" pitchFamily="18" charset="0"/>
-                <a:cs typeface="Times New Roman" panose="02020603050405020304" pitchFamily="18" charset="0"/>
-              </a:rPr>
-              <a:t>temporizador</a:t>
-            </a:r>
-            <a:r>
-              <a:rPr lang="pt-BR" sz="2000" dirty="0">
-                <a:solidFill>
-                  <a:schemeClr val="tx1"/>
-                </a:solidFill>
-                <a:latin typeface="Times New Roman" panose="02020603050405020304" pitchFamily="18" charset="0"/>
-                <a:cs typeface="Times New Roman" panose="02020603050405020304" pitchFamily="18" charset="0"/>
-              </a:rPr>
-              <a:t> não tem relógio então ele não tem horário para ligar desligar. o timer você mantém ele alimentado direto.</a:t>
-            </a:r>
-          </a:p>
-          <a:p>
-            <a:pPr marL="0" indent="0" algn="just">
-              <a:buNone/>
-            </a:pPr>
-            <a:endParaRPr lang="pt-BR" sz="2000" dirty="0">
-              <a:solidFill>
-                <a:schemeClr val="tx1"/>
-              </a:solidFill>
-              <a:latin typeface="Times New Roman" panose="02020603050405020304" pitchFamily="18" charset="0"/>
-              <a:cs typeface="Times New Roman" panose="02020603050405020304" pitchFamily="18" charset="0"/>
-            </a:endParaRPr>
-          </a:p>
-          <a:p>
-            <a:pPr marL="0" indent="0" algn="just">
-              <a:buNone/>
-            </a:pPr>
-            <a:r>
-              <a:rPr lang="pt-BR" sz="2000" dirty="0">
-                <a:solidFill>
-                  <a:schemeClr val="tx1"/>
-                </a:solidFill>
-                <a:latin typeface="Times New Roman" panose="02020603050405020304" pitchFamily="18" charset="0"/>
-                <a:cs typeface="Times New Roman" panose="02020603050405020304" pitchFamily="18" charset="0"/>
-              </a:rPr>
-              <a:t>			</a:t>
-            </a:r>
-            <a:r>
-              <a:rPr lang="pt-BR" sz="2000" b="1" dirty="0">
-                <a:solidFill>
-                  <a:srgbClr val="FF0000"/>
-                </a:solidFill>
-                <a:latin typeface="Times New Roman" panose="02020603050405020304" pitchFamily="18" charset="0"/>
-                <a:cs typeface="Times New Roman" panose="02020603050405020304" pitchFamily="18" charset="0"/>
-              </a:rPr>
-              <a:t> timer</a:t>
-            </a:r>
-            <a:r>
-              <a:rPr lang="pt-BR" sz="2000" dirty="0">
-                <a:solidFill>
-                  <a:schemeClr val="tx1"/>
-                </a:solidFill>
-                <a:latin typeface="Times New Roman" panose="02020603050405020304" pitchFamily="18" charset="0"/>
-                <a:cs typeface="Times New Roman" panose="02020603050405020304" pitchFamily="18" charset="0"/>
-              </a:rPr>
               <a:t> </a:t>
             </a:r>
             <a:r>
@@ -16227,7 +16602,7 @@
                 </a:solidFill>
                 <a:latin typeface="Times New Roman" panose="02020603050405020304" pitchFamily="18" charset="0"/>
                 <a:cs typeface="Times New Roman" panose="02020603050405020304" pitchFamily="18" charset="0"/>
-                <a:hlinkClick r:id="rId3"/>
+                <a:hlinkClick r:id="rId4"/>
               </a:rPr>
               <a:t>https://youtu.be/x9W5wjLZfRo</a:t>
             </a:r>
@@ -17225,7 +17600,7 @@
             <a:r>
               <a:rPr lang="pt-BR" sz="2000" b="1" dirty="0">
                 <a:solidFill>
-                  <a:srgbClr val="FF0000"/>
+                  <a:srgbClr val="0070C0"/>
                 </a:solidFill>
                 <a:latin typeface="Times New Roman" panose="02020603050405020304" pitchFamily="18" charset="0"/>
                 <a:cs typeface="Times New Roman" panose="02020603050405020304" pitchFamily="18" charset="0"/>
@@ -17295,7 +17670,7 @@
             <a:r>
               <a:rPr lang="pt-BR" sz="2000" b="1" dirty="0">
                 <a:solidFill>
-                  <a:srgbClr val="FF0000"/>
+                  <a:srgbClr val="0070C0"/>
                 </a:solidFill>
                 <a:latin typeface="Times New Roman" panose="02020603050405020304" pitchFamily="18" charset="0"/>
                 <a:cs typeface="Times New Roman" panose="02020603050405020304" pitchFamily="18" charset="0"/>

</xml_diff>

<commit_message>
Disciplina Micro PWM .... - 29Abr2025
</commit_message>
<xml_diff>
--- a/01 Classes/Aula 06 - Programação Microcontroladores - Periféricos Integrados - Temporizadores e PWM.pptx
+++ b/01 Classes/Aula 06 - Programação Microcontroladores - Periféricos Integrados - Temporizadores e PWM.pptx
@@ -7196,7 +7196,7 @@
                 <a:latin typeface="Times New Roman" panose="02020603050405020304" pitchFamily="18" charset="0"/>
                 <a:cs typeface="Times New Roman" panose="02020603050405020304" pitchFamily="18" charset="0"/>
               </a:rPr>
-              <a:t>. </a:t>
+              <a:t>.</a:t>
             </a:r>
           </a:p>
           <a:p>
@@ -9880,7 +9880,27 @@
                 <a:latin typeface="Times New Roman" panose="02020603050405020304" pitchFamily="18" charset="0"/>
                 <a:cs typeface="Times New Roman" panose="02020603050405020304" pitchFamily="18" charset="0"/>
               </a:rPr>
-              <a:t> é cada pedaço dessa onda que irá se repetir.</a:t>
+              <a:t> é cada pedaço dessa onda que irá se repetir, soma dos tempos </a:t>
+            </a:r>
+            <a:r>
+              <a:rPr lang="pt-BR" sz="2000" b="1" dirty="0">
+                <a:solidFill>
+                  <a:srgbClr val="FF0000"/>
+                </a:solidFill>
+                <a:latin typeface="Times New Roman" panose="02020603050405020304" pitchFamily="18" charset="0"/>
+                <a:cs typeface="Times New Roman" panose="02020603050405020304" pitchFamily="18" charset="0"/>
+              </a:rPr>
+              <a:t>ON/OFF</a:t>
+            </a:r>
+            <a:r>
+              <a:rPr lang="pt-BR" sz="2000" dirty="0">
+                <a:solidFill>
+                  <a:schemeClr val="tx1"/>
+                </a:solidFill>
+                <a:latin typeface="Times New Roman" panose="02020603050405020304" pitchFamily="18" charset="0"/>
+                <a:cs typeface="Times New Roman" panose="02020603050405020304" pitchFamily="18" charset="0"/>
+              </a:rPr>
+              <a:t>.</a:t>
             </a:r>
           </a:p>
           <a:p>
@@ -12793,10 +12813,13 @@
               <a:buChar char="§"/>
             </a:pPr>
             <a:r>
-              <a:rPr lang="pt-BR" sz="2000" dirty="0">
-                <a:solidFill>
-                  <a:schemeClr val="tx1"/>
-                </a:solidFill>
+              <a:rPr lang="pt-BR" sz="2000" b="1" dirty="0">
+                <a:solidFill>
+                  <a:schemeClr val="tx1"/>
+                </a:solidFill>
+                <a:highlight>
+                  <a:srgbClr val="FFFF00"/>
+                </a:highlight>
                 <a:latin typeface="Times New Roman" panose="02020603050405020304" pitchFamily="18" charset="0"/>
                 <a:cs typeface="Times New Roman" panose="02020603050405020304" pitchFamily="18" charset="0"/>
               </a:rPr>
@@ -13195,7 +13218,7 @@
                 <a:latin typeface="Times New Roman" panose="02020603050405020304" pitchFamily="18" charset="0"/>
                 <a:cs typeface="Times New Roman" panose="02020603050405020304" pitchFamily="18" charset="0"/>
               </a:rPr>
-              <a:t> possui 06 pinos (3,5,6,9,10,11) específicos para </a:t>
+              <a:t> possui 06 pinos (</a:t>
             </a:r>
             <a:r>
               <a:rPr lang="pt-BR" sz="2000" b="1" dirty="0">
@@ -13205,6 +13228,26 @@
                 <a:latin typeface="Times New Roman" panose="02020603050405020304" pitchFamily="18" charset="0"/>
                 <a:cs typeface="Times New Roman" panose="02020603050405020304" pitchFamily="18" charset="0"/>
               </a:rPr>
+              <a:t>3,5,6,9,10,11</a:t>
+            </a:r>
+            <a:r>
+              <a:rPr lang="pt-BR" sz="2000" dirty="0">
+                <a:solidFill>
+                  <a:schemeClr val="tx1"/>
+                </a:solidFill>
+                <a:latin typeface="Times New Roman" panose="02020603050405020304" pitchFamily="18" charset="0"/>
+                <a:cs typeface="Times New Roman" panose="02020603050405020304" pitchFamily="18" charset="0"/>
+              </a:rPr>
+              <a:t>) específicos para </a:t>
+            </a:r>
+            <a:r>
+              <a:rPr lang="pt-BR" sz="2000" b="1" dirty="0">
+                <a:solidFill>
+                  <a:srgbClr val="FF0000"/>
+                </a:solidFill>
+                <a:latin typeface="Times New Roman" panose="02020603050405020304" pitchFamily="18" charset="0"/>
+                <a:cs typeface="Times New Roman" panose="02020603050405020304" pitchFamily="18" charset="0"/>
+              </a:rPr>
               <a:t>saídas PWM</a:t>
             </a:r>
             <a:r>
@@ -13220,7 +13263,7 @@
             <a:r>
               <a:rPr lang="pt-BR" sz="2000" b="1" dirty="0">
                 <a:solidFill>
-                  <a:schemeClr val="tx1"/>
+                  <a:srgbClr val="FF0000"/>
                 </a:solidFill>
                 <a:latin typeface="Times New Roman" panose="02020603050405020304" pitchFamily="18" charset="0"/>
                 <a:cs typeface="Times New Roman" panose="02020603050405020304" pitchFamily="18" charset="0"/>
@@ -13519,7 +13562,7 @@
               <a:t>, </a:t>
             </a:r>
             <a:r>
-              <a:rPr lang="pt-BR" sz="2000" dirty="0">
+              <a:rPr lang="pt-BR" sz="2000" b="1" dirty="0">
                 <a:solidFill>
                   <a:srgbClr val="FF0000"/>
                 </a:solidFill>
@@ -15491,7 +15534,24 @@
                 <a:latin typeface="Times New Roman" panose="02020603050405020304" pitchFamily="18" charset="0"/>
                 <a:cs typeface="Times New Roman" panose="02020603050405020304" pitchFamily="18" charset="0"/>
               </a:rPr>
-              <a:t>/* PWM - controla a luminosidade de um led conforme o valor do potenciômetro */</a:t>
+              <a:t>/* </a:t>
+            </a:r>
+            <a:r>
+              <a:rPr lang="pt-BR" sz="1600" b="1" dirty="0">
+                <a:solidFill>
+                  <a:srgbClr val="FF0000"/>
+                </a:solidFill>
+                <a:latin typeface="Times New Roman" panose="02020603050405020304" pitchFamily="18" charset="0"/>
+                <a:cs typeface="Times New Roman" panose="02020603050405020304" pitchFamily="18" charset="0"/>
+              </a:rPr>
+              <a:t>PWM</a:t>
+            </a:r>
+            <a:r>
+              <a:rPr lang="pt-BR" sz="1600" dirty="0">
+                <a:latin typeface="Times New Roman" panose="02020603050405020304" pitchFamily="18" charset="0"/>
+                <a:cs typeface="Times New Roman" panose="02020603050405020304" pitchFamily="18" charset="0"/>
+              </a:rPr>
+              <a:t> - controla a luminosidade de um led conforme o valor do potenciômetro */</a:t>
             </a:r>
           </a:p>
           <a:p>
@@ -17478,17 +17538,17 @@
                 <a:latin typeface="Times New Roman" panose="02020603050405020304" pitchFamily="18" charset="0"/>
                 <a:cs typeface="Times New Roman" panose="02020603050405020304" pitchFamily="18" charset="0"/>
               </a:rPr>
-              <a:t>contar eventos</a:t>
-            </a:r>
-            <a:r>
-              <a:rPr lang="pt-BR" sz="2000" dirty="0">
-                <a:solidFill>
-                  <a:schemeClr val="tx1"/>
-                </a:solidFill>
-                <a:latin typeface="Times New Roman" panose="02020603050405020304" pitchFamily="18" charset="0"/>
-                <a:cs typeface="Times New Roman" panose="02020603050405020304" pitchFamily="18" charset="0"/>
-              </a:rPr>
-              <a:t>. </a:t>
+              <a:t>contar eventos ou controlar uma carga</a:t>
+            </a:r>
+            <a:r>
+              <a:rPr lang="pt-BR" sz="2000" dirty="0">
+                <a:solidFill>
+                  <a:schemeClr val="tx1"/>
+                </a:solidFill>
+                <a:latin typeface="Times New Roman" panose="02020603050405020304" pitchFamily="18" charset="0"/>
+                <a:cs typeface="Times New Roman" panose="02020603050405020304" pitchFamily="18" charset="0"/>
+              </a:rPr>
+              <a:t>.</a:t>
             </a:r>
           </a:p>
           <a:p>
@@ -17855,7 +17915,7 @@
               <a:buNone/>
             </a:pPr>
             <a:r>
-              <a:rPr lang="pt-BR" sz="2000" dirty="0">
+              <a:rPr lang="pt-BR" sz="2200" dirty="0">
                 <a:solidFill>
                   <a:schemeClr val="tx1"/>
                 </a:solidFill>
@@ -17865,7 +17925,7 @@
               <a:t>Isso se deve ao fato de um </a:t>
             </a:r>
             <a:r>
-              <a:rPr lang="pt-BR" sz="2000" b="1" dirty="0">
+              <a:rPr lang="pt-BR" sz="2200" b="1" dirty="0">
                 <a:solidFill>
                   <a:schemeClr val="tx1"/>
                 </a:solidFill>
@@ -17875,7 +17935,7 @@
               <a:t>contador</a:t>
             </a:r>
             <a:r>
-              <a:rPr lang="pt-BR" sz="2000" dirty="0">
+              <a:rPr lang="pt-BR" sz="2200" dirty="0">
                 <a:solidFill>
                   <a:schemeClr val="tx1"/>
                 </a:solidFill>
@@ -17885,7 +17945,7 @@
               <a:t> poder </a:t>
             </a:r>
             <a:r>
-              <a:rPr lang="pt-BR" sz="2000" b="1" dirty="0">
+              <a:rPr lang="pt-BR" sz="2200" b="1" dirty="0">
                 <a:solidFill>
                   <a:srgbClr val="FF0000"/>
                 </a:solidFill>
@@ -17895,7 +17955,7 @@
               <a:t>contar eventos</a:t>
             </a:r>
             <a:r>
-              <a:rPr lang="pt-BR" sz="2000" dirty="0">
+              <a:rPr lang="pt-BR" sz="2200" dirty="0">
                 <a:solidFill>
                   <a:schemeClr val="tx1"/>
                 </a:solidFill>
@@ -17905,7 +17965,7 @@
               <a:t> e assim trabalhar como um contador ou então </a:t>
             </a:r>
             <a:r>
-              <a:rPr lang="pt-BR" sz="2000" b="1" dirty="0">
+              <a:rPr lang="pt-BR" sz="2200" b="1" dirty="0">
                 <a:solidFill>
                   <a:srgbClr val="FF0000"/>
                 </a:solidFill>
@@ -17915,7 +17975,7 @@
               <a:t>contar tempo</a:t>
             </a:r>
             <a:r>
-              <a:rPr lang="pt-BR" sz="2000" dirty="0">
+              <a:rPr lang="pt-BR" sz="2200" dirty="0">
                 <a:solidFill>
                   <a:schemeClr val="tx1"/>
                 </a:solidFill>
@@ -17925,7 +17985,7 @@
               <a:t> e funcionar como um </a:t>
             </a:r>
             <a:r>
-              <a:rPr lang="pt-BR" sz="2000" b="1" dirty="0">
+              <a:rPr lang="pt-BR" sz="2200" b="1" dirty="0">
                 <a:solidFill>
                   <a:schemeClr val="tx1"/>
                 </a:solidFill>
@@ -17935,21 +17995,21 @@
               <a:t>temporizador</a:t>
             </a:r>
             <a:r>
-              <a:rPr lang="pt-BR" sz="2000" dirty="0">
-                <a:solidFill>
-                  <a:schemeClr val="tx1"/>
-                </a:solidFill>
-                <a:latin typeface="Times New Roman" panose="02020603050405020304" pitchFamily="18" charset="0"/>
-                <a:cs typeface="Times New Roman" panose="02020603050405020304" pitchFamily="18" charset="0"/>
-              </a:rPr>
-              <a:t>. </a:t>
+              <a:rPr lang="pt-BR" sz="2200" dirty="0">
+                <a:solidFill>
+                  <a:schemeClr val="tx1"/>
+                </a:solidFill>
+                <a:latin typeface="Times New Roman" panose="02020603050405020304" pitchFamily="18" charset="0"/>
+                <a:cs typeface="Times New Roman" panose="02020603050405020304" pitchFamily="18" charset="0"/>
+              </a:rPr>
+              <a:t>.</a:t>
             </a:r>
           </a:p>
           <a:p>
             <a:pPr marL="0" indent="0" algn="just">
               <a:buNone/>
             </a:pPr>
-            <a:endParaRPr lang="pt-BR" sz="2000" dirty="0">
+            <a:endParaRPr lang="pt-BR" sz="2200" dirty="0">
               <a:solidFill>
                 <a:schemeClr val="tx1"/>
               </a:solidFill>
@@ -17962,7 +18022,7 @@
               <a:buNone/>
             </a:pPr>
             <a:r>
-              <a:rPr lang="pt-BR" sz="2000" dirty="0">
+              <a:rPr lang="pt-BR" sz="2200" dirty="0">
                 <a:solidFill>
                   <a:schemeClr val="tx1"/>
                 </a:solidFill>
@@ -17972,7 +18032,7 @@
               <a:t>Assim sendo um </a:t>
             </a:r>
             <a:r>
-              <a:rPr lang="pt-BR" sz="2000" b="1" dirty="0">
+              <a:rPr lang="pt-BR" sz="2200" b="1" dirty="0">
                 <a:solidFill>
                   <a:schemeClr val="tx1"/>
                 </a:solidFill>
@@ -17982,7 +18042,7 @@
               <a:t>temporizador</a:t>
             </a:r>
             <a:r>
-              <a:rPr lang="pt-BR" sz="2000" dirty="0">
+              <a:rPr lang="pt-BR" sz="2200" dirty="0">
                 <a:solidFill>
                   <a:schemeClr val="tx1"/>
                 </a:solidFill>
@@ -17992,7 +18052,7 @@
               <a:t> nada mais é do que um </a:t>
             </a:r>
             <a:r>
-              <a:rPr lang="pt-BR" sz="2000" b="1" dirty="0">
+              <a:rPr lang="pt-BR" sz="2200" b="1" dirty="0">
                 <a:solidFill>
                   <a:srgbClr val="FF0000"/>
                 </a:solidFill>
@@ -18002,7 +18062,7 @@
               <a:t>contador que conta o tempo</a:t>
             </a:r>
             <a:r>
-              <a:rPr lang="pt-BR" sz="2000" dirty="0">
+              <a:rPr lang="pt-BR" sz="2200" dirty="0">
                 <a:solidFill>
                   <a:schemeClr val="tx1"/>
                 </a:solidFill>
@@ -18950,7 +19010,7 @@
                 <a:latin typeface="Times New Roman" panose="02020603050405020304" pitchFamily="18" charset="0"/>
                 <a:cs typeface="Times New Roman" panose="02020603050405020304" pitchFamily="18" charset="0"/>
               </a:rPr>
-              <a:t>. </a:t>
+              <a:t>.</a:t>
             </a:r>
           </a:p>
           <a:p>

</xml_diff>